<commit_message>
MG: continues descriptions and update graph
</commit_message>
<xml_diff>
--- a/docs/Design/MG/MG_graph.pptx
+++ b/docs/Design/MG/MG_graph.pptx
@@ -3362,7 +3362,7 @@
         </p:nvSpPr>
         <p:spPr>
           <a:xfrm>
-            <a:off x="1709153" y="300197"/>
+            <a:off x="1096887" y="300745"/>
             <a:ext cx="1235994" cy="788376"/>
           </a:xfrm>
           <a:prstGeom prst="rect">
@@ -3418,7 +3418,7 @@
         </p:nvSpPr>
         <p:spPr>
           <a:xfrm>
-            <a:off x="3257149" y="457150"/>
+            <a:off x="2644883" y="457698"/>
             <a:ext cx="1938240" cy="476661"/>
           </a:xfrm>
           <a:prstGeom prst="rect">
@@ -3471,7 +3471,7 @@
         </p:nvSpPr>
         <p:spPr>
           <a:xfrm>
-            <a:off x="5561508" y="457150"/>
+            <a:off x="4949242" y="457698"/>
             <a:ext cx="1576435" cy="476662"/>
           </a:xfrm>
           <a:prstGeom prst="rect">
@@ -3536,7 +3536,7 @@
         </p:nvCxnSpPr>
         <p:spPr>
           <a:xfrm>
-            <a:off x="2945147" y="694385"/>
+            <a:off x="2332881" y="694933"/>
             <a:ext cx="312002" cy="1096"/>
           </a:xfrm>
           <a:prstGeom prst="straightConnector1">
@@ -3579,7 +3579,7 @@
         </p:nvCxnSpPr>
         <p:spPr>
           <a:xfrm>
-            <a:off x="5195389" y="695480"/>
+            <a:off x="4583123" y="696028"/>
             <a:ext cx="366119" cy="1"/>
           </a:xfrm>
           <a:prstGeom prst="straightConnector1">
@@ -3622,7 +3622,7 @@
         </p:nvCxnSpPr>
         <p:spPr>
           <a:xfrm flipV="1">
-            <a:off x="7137943" y="694385"/>
+            <a:off x="6525677" y="694933"/>
             <a:ext cx="909898" cy="1097"/>
           </a:xfrm>
           <a:prstGeom prst="straightConnector1">
@@ -3661,7 +3661,7 @@
         </p:nvGrpSpPr>
         <p:grpSpPr>
           <a:xfrm>
-            <a:off x="8047842" y="1437754"/>
+            <a:off x="7435576" y="1438302"/>
             <a:ext cx="2435006" cy="5118954"/>
             <a:chOff x="1892567" y="1576045"/>
             <a:chExt cx="2162934" cy="4546994"/>
@@ -4166,7 +4166,7 @@
         </p:nvCxnSpPr>
         <p:spPr>
           <a:xfrm rot="16200000" flipH="1">
-            <a:off x="6245639" y="1037899"/>
+            <a:off x="5633373" y="1038447"/>
             <a:ext cx="1906291" cy="1698117"/>
           </a:xfrm>
           <a:prstGeom prst="bentConnector2">
@@ -4208,7 +4208,7 @@
         </p:nvCxnSpPr>
         <p:spPr>
           <a:xfrm rot="16200000" flipH="1">
-            <a:off x="5955498" y="1328039"/>
+            <a:off x="5343232" y="1328587"/>
             <a:ext cx="2486573" cy="1698117"/>
           </a:xfrm>
           <a:prstGeom prst="bentConnector2">
@@ -4250,7 +4250,7 @@
         </p:nvCxnSpPr>
         <p:spPr>
           <a:xfrm rot="16200000" flipH="1">
-            <a:off x="5665784" y="1617753"/>
+            <a:off x="5053518" y="1618301"/>
             <a:ext cx="3066001" cy="1698117"/>
           </a:xfrm>
           <a:prstGeom prst="bentConnector2">
@@ -4292,7 +4292,7 @@
         </p:nvCxnSpPr>
         <p:spPr>
           <a:xfrm rot="16200000" flipH="1">
-            <a:off x="5376071" y="1907467"/>
+            <a:off x="4763805" y="1908015"/>
             <a:ext cx="3645428" cy="1698117"/>
           </a:xfrm>
           <a:prstGeom prst="bentConnector2">
@@ -4334,7 +4334,7 @@
         </p:nvCxnSpPr>
         <p:spPr>
           <a:xfrm rot="16200000" flipH="1">
-            <a:off x="5085929" y="2197609"/>
+            <a:off x="4473663" y="2198157"/>
             <a:ext cx="4225710" cy="1698117"/>
           </a:xfrm>
           <a:prstGeom prst="bentConnector2">
@@ -4377,7 +4377,7 @@
         </p:nvCxnSpPr>
         <p:spPr>
           <a:xfrm rot="16200000" flipH="1">
-            <a:off x="4796215" y="2487322"/>
+            <a:off x="4183949" y="2487870"/>
             <a:ext cx="4805138" cy="1698117"/>
           </a:xfrm>
           <a:prstGeom prst="bentConnector2">
@@ -4419,7 +4419,7 @@
         </p:nvCxnSpPr>
         <p:spPr>
           <a:xfrm rot="16200000" flipH="1">
-            <a:off x="4506500" y="2777036"/>
+            <a:off x="3894234" y="2777584"/>
             <a:ext cx="5384566" cy="1698116"/>
           </a:xfrm>
           <a:prstGeom prst="bentConnector2">
@@ -4461,7 +4461,7 @@
         </p:nvCxnSpPr>
         <p:spPr>
           <a:xfrm rot="16200000" flipH="1">
-            <a:off x="6537193" y="746344"/>
+            <a:off x="5924927" y="746892"/>
             <a:ext cx="1323183" cy="1698117"/>
           </a:xfrm>
           <a:prstGeom prst="bentConnector2">
@@ -4503,7 +4503,7 @@
         </p:nvCxnSpPr>
         <p:spPr>
           <a:xfrm rot="16200000" flipH="1">
-            <a:off x="6827648" y="455890"/>
+            <a:off x="6215382" y="456438"/>
             <a:ext cx="742274" cy="1698117"/>
           </a:xfrm>
           <a:prstGeom prst="bentConnector2">
@@ -4542,7 +4542,7 @@
         </p:nvGrpSpPr>
         <p:grpSpPr>
           <a:xfrm>
-            <a:off x="4545365" y="1440750"/>
+            <a:off x="3933099" y="1441298"/>
             <a:ext cx="1477370" cy="1670705"/>
             <a:chOff x="539134" y="2952142"/>
             <a:chExt cx="1312298" cy="1484031"/>
@@ -4725,7 +4725,7 @@
         </p:nvCxnSpPr>
         <p:spPr>
           <a:xfrm rot="16200000" flipH="1">
-            <a:off x="4013182" y="1146898"/>
+            <a:off x="3400916" y="1147446"/>
             <a:ext cx="745271" cy="319095"/>
           </a:xfrm>
           <a:prstGeom prst="bentConnector2">
@@ -4767,7 +4767,7 @@
         </p:nvCxnSpPr>
         <p:spPr>
           <a:xfrm rot="16200000" flipH="1">
-            <a:off x="3714671" y="1445408"/>
+            <a:off x="3102405" y="1445956"/>
             <a:ext cx="1342292" cy="319095"/>
           </a:xfrm>
           <a:prstGeom prst="bentConnector2">
@@ -4809,7 +4809,7 @@
         </p:nvCxnSpPr>
         <p:spPr>
           <a:xfrm rot="16200000" flipH="1">
-            <a:off x="3416160" y="1743919"/>
+            <a:off x="2803894" y="1744467"/>
             <a:ext cx="1939314" cy="319095"/>
           </a:xfrm>
           <a:prstGeom prst="bentConnector2">
@@ -4848,7 +4848,7 @@
         </p:nvGrpSpPr>
         <p:grpSpPr>
           <a:xfrm>
-            <a:off x="4545365" y="3434642"/>
+            <a:off x="3933099" y="3435190"/>
             <a:ext cx="1477370" cy="1075682"/>
             <a:chOff x="4599259" y="3762688"/>
             <a:chExt cx="1312298" cy="955492"/>
@@ -4994,7 +4994,7 @@
         </p:nvCxnSpPr>
         <p:spPr>
           <a:xfrm rot="16200000" flipH="1">
-            <a:off x="3016235" y="2143844"/>
+            <a:off x="2403969" y="2144392"/>
             <a:ext cx="2739163" cy="319095"/>
           </a:xfrm>
           <a:prstGeom prst="bentConnector2">
@@ -5036,7 +5036,7 @@
         </p:nvCxnSpPr>
         <p:spPr>
           <a:xfrm rot="16200000" flipH="1">
-            <a:off x="2716726" y="2443354"/>
+            <a:off x="2104460" y="2443902"/>
             <a:ext cx="3338183" cy="319095"/>
           </a:xfrm>
           <a:prstGeom prst="bentConnector2">
@@ -5075,7 +5075,7 @@
         </p:nvSpPr>
         <p:spPr>
           <a:xfrm>
-            <a:off x="1709153" y="1439946"/>
+            <a:off x="1096887" y="1440494"/>
             <a:ext cx="1235993" cy="474470"/>
           </a:xfrm>
           <a:prstGeom prst="rect">
@@ -5128,7 +5128,7 @@
         </p:nvCxnSpPr>
         <p:spPr>
           <a:xfrm>
-            <a:off x="2327150" y="1088573"/>
+            <a:off x="1714884" y="1089121"/>
             <a:ext cx="0" cy="351373"/>
           </a:xfrm>
           <a:prstGeom prst="straightConnector1">
@@ -5167,7 +5167,7 @@
         </p:nvSpPr>
         <p:spPr>
           <a:xfrm>
-            <a:off x="8047842" y="457150"/>
+            <a:off x="7435576" y="457698"/>
             <a:ext cx="1235993" cy="474470"/>
           </a:xfrm>
           <a:prstGeom prst="rect">
@@ -5216,7 +5216,7 @@
         </p:nvSpPr>
         <p:spPr>
           <a:xfrm>
-            <a:off x="1709152" y="3245286"/>
+            <a:off x="1096886" y="3245834"/>
             <a:ext cx="1235994" cy="788376"/>
           </a:xfrm>
           <a:prstGeom prst="rect">
@@ -5279,13 +5279,103 @@
         </p:nvCxnSpPr>
         <p:spPr>
           <a:xfrm rot="5400000">
-            <a:off x="2120972" y="1139988"/>
+            <a:off x="1508706" y="1140536"/>
             <a:ext cx="2311475" cy="1899120"/>
           </a:xfrm>
           <a:prstGeom prst="bentConnector3">
             <a:avLst>
               <a:gd name="adj1" fmla="val 71187"/>
             </a:avLst>
+          </a:prstGeom>
+          <a:ln>
+            <a:tailEnd type="triangle"/>
+          </a:ln>
+        </p:spPr>
+        <p:style>
+          <a:lnRef idx="1">
+            <a:schemeClr val="accent1"/>
+          </a:lnRef>
+          <a:fillRef idx="0">
+            <a:schemeClr val="accent1"/>
+          </a:fillRef>
+          <a:effectRef idx="0">
+            <a:schemeClr val="accent1"/>
+          </a:effectRef>
+          <a:fontRef idx="minor">
+            <a:schemeClr val="tx1"/>
+          </a:fontRef>
+        </p:style>
+      </p:cxnSp>
+      <p:sp>
+        <p:nvSpPr>
+          <p:cNvPr id="2" name="Rectangle 1">
+            <a:extLst>
+              <a:ext uri="{FF2B5EF4-FFF2-40B4-BE49-F238E27FC236}">
+                <a16:creationId xmlns:a16="http://schemas.microsoft.com/office/drawing/2014/main" id="{8EABAEA7-15D6-396E-7F7D-9B532D95C92E}"/>
+              </a:ext>
+            </a:extLst>
+          </p:cNvPr>
+          <p:cNvSpPr/>
+          <p:nvPr/>
+        </p:nvSpPr>
+        <p:spPr>
+          <a:xfrm>
+            <a:off x="9249003" y="354933"/>
+            <a:ext cx="1846112" cy="680000"/>
+          </a:xfrm>
+          <a:prstGeom prst="rect">
+            <a:avLst/>
+          </a:prstGeom>
+        </p:spPr>
+        <p:style>
+          <a:lnRef idx="2">
+            <a:schemeClr val="accent1"/>
+          </a:lnRef>
+          <a:fillRef idx="1">
+            <a:schemeClr val="lt1"/>
+          </a:fillRef>
+          <a:effectRef idx="0">
+            <a:schemeClr val="accent1"/>
+          </a:effectRef>
+          <a:fontRef idx="minor">
+            <a:schemeClr val="dk1"/>
+          </a:fontRef>
+        </p:style>
+        <p:txBody>
+          <a:bodyPr rtlCol="0" anchor="ctr"/>
+          <a:lstStyle/>
+          <a:p>
+            <a:pPr algn="ctr"/>
+            <a:r>
+              <a:rPr lang="en-CA" sz="1600" dirty="0"/>
+              <a:t>Draw Stage / Canvas Object</a:t>
+            </a:r>
+          </a:p>
+        </p:txBody>
+      </p:sp>
+      <p:cxnSp>
+        <p:nvCxnSpPr>
+          <p:cNvPr id="7" name="Straight Arrow Connector 6">
+            <a:extLst>
+              <a:ext uri="{FF2B5EF4-FFF2-40B4-BE49-F238E27FC236}">
+                <a16:creationId xmlns:a16="http://schemas.microsoft.com/office/drawing/2014/main" id="{780EAEEF-27DD-43BB-8E24-FC5D7CA89F44}"/>
+              </a:ext>
+            </a:extLst>
+          </p:cNvPr>
+          <p:cNvCxnSpPr>
+            <a:cxnSpLocks/>
+            <a:stCxn id="121" idx="3"/>
+            <a:endCxn id="2" idx="1"/>
+          </p:cNvCxnSpPr>
+          <p:nvPr/>
+        </p:nvCxnSpPr>
+        <p:spPr>
+          <a:xfrm>
+            <a:off x="8671569" y="694933"/>
+            <a:ext cx="577434" cy="0"/>
+          </a:xfrm>
+          <a:prstGeom prst="straightConnector1">
+            <a:avLst/>
           </a:prstGeom>
           <a:ln>
             <a:tailEnd type="triangle"/>

</xml_diff>

<commit_message>
MG: html5 refs, update graph, some desc.
</commit_message>
<xml_diff>
--- a/docs/Design/MG/MG_graph.pptx
+++ b/docs/Design/MG/MG_graph.pptx
@@ -5347,8 +5347,12 @@
           <a:p>
             <a:pPr algn="ctr"/>
             <a:r>
+              <a:rPr lang="en-CA" sz="1600"/>
+              <a:t>Drawing </a:t>
+            </a:r>
+            <a:r>
               <a:rPr lang="en-CA" sz="1600" dirty="0"/>
-              <a:t>Draw Stage / Canvas Object</a:t>
+              <a:t>Stage / Canvas Object</a:t>
             </a:r>
           </a:p>
         </p:txBody>

</xml_diff>

<commit_message>
update MG graph, continue MIS
</commit_message>
<xml_diff>
--- a/docs/Design/MG/MG_graph.pptx
+++ b/docs/Design/MG/MG_graph.pptx
@@ -262,7 +262,7 @@
           <a:p>
             <a:fld id="{F47AF883-73CD-4D01-B3F1-B6051B25B1FC}" type="datetimeFigureOut">
               <a:rPr lang="en-CA" smtClean="0"/>
-              <a:t>2023-03-18</a:t>
+              <a:t>2023-03-19</a:t>
             </a:fld>
             <a:endParaRPr lang="en-CA"/>
           </a:p>
@@ -462,7 +462,7 @@
           <a:p>
             <a:fld id="{F47AF883-73CD-4D01-B3F1-B6051B25B1FC}" type="datetimeFigureOut">
               <a:rPr lang="en-CA" smtClean="0"/>
-              <a:t>2023-03-18</a:t>
+              <a:t>2023-03-19</a:t>
             </a:fld>
             <a:endParaRPr lang="en-CA"/>
           </a:p>
@@ -672,7 +672,7 @@
           <a:p>
             <a:fld id="{F47AF883-73CD-4D01-B3F1-B6051B25B1FC}" type="datetimeFigureOut">
               <a:rPr lang="en-CA" smtClean="0"/>
-              <a:t>2023-03-18</a:t>
+              <a:t>2023-03-19</a:t>
             </a:fld>
             <a:endParaRPr lang="en-CA"/>
           </a:p>
@@ -872,7 +872,7 @@
           <a:p>
             <a:fld id="{F47AF883-73CD-4D01-B3F1-B6051B25B1FC}" type="datetimeFigureOut">
               <a:rPr lang="en-CA" smtClean="0"/>
-              <a:t>2023-03-18</a:t>
+              <a:t>2023-03-19</a:t>
             </a:fld>
             <a:endParaRPr lang="en-CA"/>
           </a:p>
@@ -1148,7 +1148,7 @@
           <a:p>
             <a:fld id="{F47AF883-73CD-4D01-B3F1-B6051B25B1FC}" type="datetimeFigureOut">
               <a:rPr lang="en-CA" smtClean="0"/>
-              <a:t>2023-03-18</a:t>
+              <a:t>2023-03-19</a:t>
             </a:fld>
             <a:endParaRPr lang="en-CA"/>
           </a:p>
@@ -1416,7 +1416,7 @@
           <a:p>
             <a:fld id="{F47AF883-73CD-4D01-B3F1-B6051B25B1FC}" type="datetimeFigureOut">
               <a:rPr lang="en-CA" smtClean="0"/>
-              <a:t>2023-03-18</a:t>
+              <a:t>2023-03-19</a:t>
             </a:fld>
             <a:endParaRPr lang="en-CA"/>
           </a:p>
@@ -1831,7 +1831,7 @@
           <a:p>
             <a:fld id="{F47AF883-73CD-4D01-B3F1-B6051B25B1FC}" type="datetimeFigureOut">
               <a:rPr lang="en-CA" smtClean="0"/>
-              <a:t>2023-03-18</a:t>
+              <a:t>2023-03-19</a:t>
             </a:fld>
             <a:endParaRPr lang="en-CA"/>
           </a:p>
@@ -1973,7 +1973,7 @@
           <a:p>
             <a:fld id="{F47AF883-73CD-4D01-B3F1-B6051B25B1FC}" type="datetimeFigureOut">
               <a:rPr lang="en-CA" smtClean="0"/>
-              <a:t>2023-03-18</a:t>
+              <a:t>2023-03-19</a:t>
             </a:fld>
             <a:endParaRPr lang="en-CA"/>
           </a:p>
@@ -2086,7 +2086,7 @@
           <a:p>
             <a:fld id="{F47AF883-73CD-4D01-B3F1-B6051B25B1FC}" type="datetimeFigureOut">
               <a:rPr lang="en-CA" smtClean="0"/>
-              <a:t>2023-03-18</a:t>
+              <a:t>2023-03-19</a:t>
             </a:fld>
             <a:endParaRPr lang="en-CA"/>
           </a:p>
@@ -2399,7 +2399,7 @@
           <a:p>
             <a:fld id="{F47AF883-73CD-4D01-B3F1-B6051B25B1FC}" type="datetimeFigureOut">
               <a:rPr lang="en-CA" smtClean="0"/>
-              <a:t>2023-03-18</a:t>
+              <a:t>2023-03-19</a:t>
             </a:fld>
             <a:endParaRPr lang="en-CA"/>
           </a:p>
@@ -2688,7 +2688,7 @@
           <a:p>
             <a:fld id="{F47AF883-73CD-4D01-B3F1-B6051B25B1FC}" type="datetimeFigureOut">
               <a:rPr lang="en-CA" smtClean="0"/>
-              <a:t>2023-03-18</a:t>
+              <a:t>2023-03-19</a:t>
             </a:fld>
             <a:endParaRPr lang="en-CA"/>
           </a:p>
@@ -2931,7 +2931,7 @@
           <a:p>
             <a:fld id="{F47AF883-73CD-4D01-B3F1-B6051B25B1FC}" type="datetimeFigureOut">
               <a:rPr lang="en-CA" smtClean="0"/>
-              <a:t>2023-03-18</a:t>
+              <a:t>2023-03-19</a:t>
             </a:fld>
             <a:endParaRPr lang="en-CA"/>
           </a:p>
@@ -3542,7 +3542,10 @@
           <a:prstGeom prst="straightConnector1">
             <a:avLst/>
           </a:prstGeom>
-          <a:ln>
+          <a:ln w="12700">
+            <a:solidFill>
+              <a:schemeClr val="tx1"/>
+            </a:solidFill>
             <a:tailEnd type="triangle"/>
           </a:ln>
         </p:spPr>
@@ -3585,7 +3588,10 @@
           <a:prstGeom prst="straightConnector1">
             <a:avLst/>
           </a:prstGeom>
-          <a:ln>
+          <a:ln w="12700">
+            <a:solidFill>
+              <a:schemeClr val="tx1"/>
+            </a:solidFill>
             <a:tailEnd type="triangle"/>
           </a:ln>
         </p:spPr>
@@ -3628,7 +3634,10 @@
           <a:prstGeom prst="straightConnector1">
             <a:avLst/>
           </a:prstGeom>
-          <a:ln>
+          <a:ln w="12700">
+            <a:solidFill>
+              <a:schemeClr val="tx1"/>
+            </a:solidFill>
             <a:tailEnd type="triangle"/>
           </a:ln>
         </p:spPr>
@@ -4172,7 +4181,10 @@
           <a:prstGeom prst="bentConnector2">
             <a:avLst/>
           </a:prstGeom>
-          <a:ln>
+          <a:ln w="12700">
+            <a:solidFill>
+              <a:schemeClr val="tx1"/>
+            </a:solidFill>
             <a:tailEnd type="triangle"/>
           </a:ln>
         </p:spPr>
@@ -4214,7 +4226,10 @@
           <a:prstGeom prst="bentConnector2">
             <a:avLst/>
           </a:prstGeom>
-          <a:ln>
+          <a:ln w="12700">
+            <a:solidFill>
+              <a:schemeClr val="tx1"/>
+            </a:solidFill>
             <a:tailEnd type="triangle"/>
           </a:ln>
         </p:spPr>
@@ -4256,7 +4271,10 @@
           <a:prstGeom prst="bentConnector2">
             <a:avLst/>
           </a:prstGeom>
-          <a:ln>
+          <a:ln w="12700">
+            <a:solidFill>
+              <a:schemeClr val="tx1"/>
+            </a:solidFill>
             <a:tailEnd type="triangle"/>
           </a:ln>
         </p:spPr>
@@ -4298,7 +4316,10 @@
           <a:prstGeom prst="bentConnector2">
             <a:avLst/>
           </a:prstGeom>
-          <a:ln>
+          <a:ln w="12700">
+            <a:solidFill>
+              <a:schemeClr val="tx1"/>
+            </a:solidFill>
             <a:tailEnd type="triangle"/>
           </a:ln>
         </p:spPr>
@@ -4327,6 +4348,7 @@
             </a:extLst>
           </p:cNvPr>
           <p:cNvCxnSpPr>
+            <a:cxnSpLocks/>
             <a:stCxn id="6" idx="2"/>
             <a:endCxn id="37" idx="1"/>
           </p:cNvCxnSpPr>
@@ -4340,7 +4362,10 @@
           <a:prstGeom prst="bentConnector2">
             <a:avLst/>
           </a:prstGeom>
-          <a:ln>
+          <a:ln w="12700">
+            <a:solidFill>
+              <a:schemeClr val="tx1"/>
+            </a:solidFill>
             <a:tailEnd type="triangle"/>
           </a:ln>
         </p:spPr>
@@ -4383,7 +4408,10 @@
           <a:prstGeom prst="bentConnector2">
             <a:avLst/>
           </a:prstGeom>
-          <a:ln>
+          <a:ln w="12700">
+            <a:solidFill>
+              <a:schemeClr val="tx1"/>
+            </a:solidFill>
             <a:tailEnd type="triangle"/>
           </a:ln>
         </p:spPr>
@@ -4425,7 +4453,10 @@
           <a:prstGeom prst="bentConnector2">
             <a:avLst/>
           </a:prstGeom>
-          <a:ln>
+          <a:ln w="12700">
+            <a:solidFill>
+              <a:schemeClr val="tx1"/>
+            </a:solidFill>
             <a:tailEnd type="triangle"/>
           </a:ln>
         </p:spPr>
@@ -4467,7 +4498,10 @@
           <a:prstGeom prst="bentConnector2">
             <a:avLst/>
           </a:prstGeom>
-          <a:ln>
+          <a:ln w="12700">
+            <a:solidFill>
+              <a:schemeClr val="tx1"/>
+            </a:solidFill>
             <a:tailEnd type="triangle"/>
           </a:ln>
         </p:spPr>
@@ -4509,7 +4543,10 @@
           <a:prstGeom prst="bentConnector2">
             <a:avLst/>
           </a:prstGeom>
-          <a:ln>
+          <a:ln w="12700">
+            <a:solidFill>
+              <a:schemeClr val="tx1"/>
+            </a:solidFill>
             <a:tailEnd type="triangle"/>
           </a:ln>
         </p:spPr>
@@ -4731,7 +4768,10 @@
           <a:prstGeom prst="bentConnector2">
             <a:avLst/>
           </a:prstGeom>
-          <a:ln>
+          <a:ln w="12700">
+            <a:solidFill>
+              <a:schemeClr val="tx1"/>
+            </a:solidFill>
             <a:tailEnd type="triangle"/>
           </a:ln>
         </p:spPr>
@@ -4773,7 +4813,10 @@
           <a:prstGeom prst="bentConnector2">
             <a:avLst/>
           </a:prstGeom>
-          <a:ln>
+          <a:ln w="12700">
+            <a:solidFill>
+              <a:schemeClr val="tx1"/>
+            </a:solidFill>
             <a:tailEnd type="triangle"/>
           </a:ln>
         </p:spPr>
@@ -4815,7 +4858,10 @@
           <a:prstGeom prst="bentConnector2">
             <a:avLst/>
           </a:prstGeom>
-          <a:ln>
+          <a:ln w="12700">
+            <a:solidFill>
+              <a:schemeClr val="tx1"/>
+            </a:solidFill>
             <a:tailEnd type="triangle"/>
           </a:ln>
         </p:spPr>
@@ -5000,7 +5046,10 @@
           <a:prstGeom prst="bentConnector2">
             <a:avLst/>
           </a:prstGeom>
-          <a:ln>
+          <a:ln w="12700">
+            <a:solidFill>
+              <a:schemeClr val="tx1"/>
+            </a:solidFill>
             <a:tailEnd type="triangle"/>
           </a:ln>
         </p:spPr>
@@ -5042,7 +5091,10 @@
           <a:prstGeom prst="bentConnector2">
             <a:avLst/>
           </a:prstGeom>
-          <a:ln>
+          <a:ln w="12700">
+            <a:solidFill>
+              <a:schemeClr val="tx1"/>
+            </a:solidFill>
             <a:tailEnd type="triangle"/>
           </a:ln>
         </p:spPr>
@@ -5075,7 +5127,7 @@
         </p:nvSpPr>
         <p:spPr>
           <a:xfrm>
-            <a:off x="1096887" y="1440494"/>
+            <a:off x="4053787" y="5149176"/>
             <a:ext cx="1235993" cy="474470"/>
           </a:xfrm>
           <a:prstGeom prst="rect">
@@ -5121,20 +5173,23 @@
           </p:cNvPr>
           <p:cNvCxnSpPr>
             <a:cxnSpLocks/>
-            <a:stCxn id="4" idx="2"/>
+            <a:stCxn id="96" idx="2"/>
             <a:endCxn id="105" idx="0"/>
           </p:cNvCxnSpPr>
           <p:nvPr/>
         </p:nvCxnSpPr>
         <p:spPr>
           <a:xfrm>
-            <a:off x="1714884" y="1089121"/>
-            <a:ext cx="0" cy="351373"/>
+            <a:off x="4671784" y="4510872"/>
+            <a:ext cx="0" cy="638304"/>
           </a:xfrm>
           <a:prstGeom prst="straightConnector1">
             <a:avLst/>
           </a:prstGeom>
-          <a:ln>
+          <a:ln w="12700">
+            <a:solidFill>
+              <a:schemeClr val="tx1"/>
+            </a:solidFill>
             <a:tailEnd type="triangle"/>
           </a:ln>
         </p:spPr>
@@ -5287,7 +5342,10 @@
               <a:gd name="adj1" fmla="val 71187"/>
             </a:avLst>
           </a:prstGeom>
-          <a:ln>
+          <a:ln w="12700">
+            <a:solidFill>
+              <a:schemeClr val="tx1"/>
+            </a:solidFill>
             <a:tailEnd type="triangle"/>
           </a:ln>
         </p:spPr>
@@ -5381,7 +5439,10 @@
           <a:prstGeom prst="straightConnector1">
             <a:avLst/>
           </a:prstGeom>
-          <a:ln>
+          <a:ln w="12700">
+            <a:solidFill>
+              <a:schemeClr val="tx1"/>
+            </a:solidFill>
             <a:tailEnd type="triangle"/>
           </a:ln>
         </p:spPr>

</xml_diff>

<commit_message>
Update MG after prof review
</commit_message>
<xml_diff>
--- a/docs/Design/MG/MG_graph.pptx
+++ b/docs/Design/MG/MG_graph.pptx
@@ -262,7 +262,7 @@
           <a:p>
             <a:fld id="{F47AF883-73CD-4D01-B3F1-B6051B25B1FC}" type="datetimeFigureOut">
               <a:rPr lang="en-CA" smtClean="0"/>
-              <a:t>2023-03-19</a:t>
+              <a:t>2023-04-12</a:t>
             </a:fld>
             <a:endParaRPr lang="en-CA"/>
           </a:p>
@@ -462,7 +462,7 @@
           <a:p>
             <a:fld id="{F47AF883-73CD-4D01-B3F1-B6051B25B1FC}" type="datetimeFigureOut">
               <a:rPr lang="en-CA" smtClean="0"/>
-              <a:t>2023-03-19</a:t>
+              <a:t>2023-04-12</a:t>
             </a:fld>
             <a:endParaRPr lang="en-CA"/>
           </a:p>
@@ -672,7 +672,7 @@
           <a:p>
             <a:fld id="{F47AF883-73CD-4D01-B3F1-B6051B25B1FC}" type="datetimeFigureOut">
               <a:rPr lang="en-CA" smtClean="0"/>
-              <a:t>2023-03-19</a:t>
+              <a:t>2023-04-12</a:t>
             </a:fld>
             <a:endParaRPr lang="en-CA"/>
           </a:p>
@@ -872,7 +872,7 @@
           <a:p>
             <a:fld id="{F47AF883-73CD-4D01-B3F1-B6051B25B1FC}" type="datetimeFigureOut">
               <a:rPr lang="en-CA" smtClean="0"/>
-              <a:t>2023-03-19</a:t>
+              <a:t>2023-04-12</a:t>
             </a:fld>
             <a:endParaRPr lang="en-CA"/>
           </a:p>
@@ -1148,7 +1148,7 @@
           <a:p>
             <a:fld id="{F47AF883-73CD-4D01-B3F1-B6051B25B1FC}" type="datetimeFigureOut">
               <a:rPr lang="en-CA" smtClean="0"/>
-              <a:t>2023-03-19</a:t>
+              <a:t>2023-04-12</a:t>
             </a:fld>
             <a:endParaRPr lang="en-CA"/>
           </a:p>
@@ -1416,7 +1416,7 @@
           <a:p>
             <a:fld id="{F47AF883-73CD-4D01-B3F1-B6051B25B1FC}" type="datetimeFigureOut">
               <a:rPr lang="en-CA" smtClean="0"/>
-              <a:t>2023-03-19</a:t>
+              <a:t>2023-04-12</a:t>
             </a:fld>
             <a:endParaRPr lang="en-CA"/>
           </a:p>
@@ -1831,7 +1831,7 @@
           <a:p>
             <a:fld id="{F47AF883-73CD-4D01-B3F1-B6051B25B1FC}" type="datetimeFigureOut">
               <a:rPr lang="en-CA" smtClean="0"/>
-              <a:t>2023-03-19</a:t>
+              <a:t>2023-04-12</a:t>
             </a:fld>
             <a:endParaRPr lang="en-CA"/>
           </a:p>
@@ -1973,7 +1973,7 @@
           <a:p>
             <a:fld id="{F47AF883-73CD-4D01-B3F1-B6051B25B1FC}" type="datetimeFigureOut">
               <a:rPr lang="en-CA" smtClean="0"/>
-              <a:t>2023-03-19</a:t>
+              <a:t>2023-04-12</a:t>
             </a:fld>
             <a:endParaRPr lang="en-CA"/>
           </a:p>
@@ -2086,7 +2086,7 @@
           <a:p>
             <a:fld id="{F47AF883-73CD-4D01-B3F1-B6051B25B1FC}" type="datetimeFigureOut">
               <a:rPr lang="en-CA" smtClean="0"/>
-              <a:t>2023-03-19</a:t>
+              <a:t>2023-04-12</a:t>
             </a:fld>
             <a:endParaRPr lang="en-CA"/>
           </a:p>
@@ -2399,7 +2399,7 @@
           <a:p>
             <a:fld id="{F47AF883-73CD-4D01-B3F1-B6051B25B1FC}" type="datetimeFigureOut">
               <a:rPr lang="en-CA" smtClean="0"/>
-              <a:t>2023-03-19</a:t>
+              <a:t>2023-04-12</a:t>
             </a:fld>
             <a:endParaRPr lang="en-CA"/>
           </a:p>
@@ -2688,7 +2688,7 @@
           <a:p>
             <a:fld id="{F47AF883-73CD-4D01-B3F1-B6051B25B1FC}" type="datetimeFigureOut">
               <a:rPr lang="en-CA" smtClean="0"/>
-              <a:t>2023-03-19</a:t>
+              <a:t>2023-04-12</a:t>
             </a:fld>
             <a:endParaRPr lang="en-CA"/>
           </a:p>
@@ -2931,7 +2931,7 @@
           <a:p>
             <a:fld id="{F47AF883-73CD-4D01-B3F1-B6051B25B1FC}" type="datetimeFigureOut">
               <a:rPr lang="en-CA" smtClean="0"/>
-              <a:t>2023-03-19</a:t>
+              <a:t>2023-04-12</a:t>
             </a:fld>
             <a:endParaRPr lang="en-CA"/>
           </a:p>
@@ -5250,7 +5250,7 @@
         </p:nvSpPr>
         <p:spPr>
           <a:xfrm>
-            <a:off x="1096886" y="3073664"/>
+            <a:off x="1096886" y="1875933"/>
             <a:ext cx="1235994" cy="788376"/>
           </a:xfrm>
           <a:prstGeom prst="rect">
@@ -5306,6 +5306,7 @@
             </a:extLst>
           </p:cNvPr>
           <p:cNvCxnSpPr>
+            <a:cxnSpLocks/>
             <a:stCxn id="5" idx="2"/>
             <a:endCxn id="128" idx="0"/>
           </p:cNvCxnSpPr>
@@ -5313,12 +5314,12 @@
         </p:nvCxnSpPr>
         <p:spPr>
           <a:xfrm rot="5400000">
-            <a:off x="1508706" y="968366"/>
-            <a:ext cx="2311475" cy="1899120"/>
+            <a:off x="2107571" y="369501"/>
+            <a:ext cx="1113744" cy="1899120"/>
           </a:xfrm>
           <a:prstGeom prst="bentConnector3">
             <a:avLst>
-              <a:gd name="adj1" fmla="val 71187"/>
+              <a:gd name="adj1" fmla="val 35546"/>
             </a:avLst>
           </a:prstGeom>
           <a:ln w="12700">

</xml_diff>